<commit_message>
added more methodology information
</commit_message>
<xml_diff>
--- a/workflow_chart.pptx
+++ b/workflow_chart.pptx
@@ -3600,7 +3600,7 @@
         </p:nvSpPr>
         <p:spPr>
           <a:xfrm>
-            <a:off x="14165107" y="482010"/>
+            <a:off x="11792163" y="457061"/>
             <a:ext cx="1838322" cy="930583"/>
           </a:xfrm>
           <a:prstGeom prst="rect">
@@ -3788,65 +3788,6 @@
           </a:fontRef>
         </p:style>
       </p:cxnSp>
-      <p:sp>
-        <p:nvSpPr>
-          <p:cNvPr id="43" name="Rectangle 42">
-            <a:extLst>
-              <a:ext uri="{FF2B5EF4-FFF2-40B4-BE49-F238E27FC236}">
-                <a16:creationId xmlns:a16="http://schemas.microsoft.com/office/drawing/2014/main" id="{E3C4F93D-54CD-4D84-9237-9E02A8F1CB5E}"/>
-              </a:ext>
-            </a:extLst>
-          </p:cNvPr>
-          <p:cNvSpPr/>
-          <p:nvPr/>
-        </p:nvSpPr>
-        <p:spPr>
-          <a:xfrm>
-            <a:off x="15422852" y="2293277"/>
-            <a:ext cx="1838322" cy="930583"/>
-          </a:xfrm>
-          <a:prstGeom prst="rect">
-            <a:avLst/>
-          </a:prstGeom>
-          <a:solidFill>
-            <a:schemeClr val="accent1">
-              <a:lumMod val="20000"/>
-              <a:lumOff val="80000"/>
-            </a:schemeClr>
-          </a:solidFill>
-        </p:spPr>
-        <p:style>
-          <a:lnRef idx="2">
-            <a:schemeClr val="accent1">
-              <a:shade val="50000"/>
-            </a:schemeClr>
-          </a:lnRef>
-          <a:fillRef idx="1">
-            <a:schemeClr val="accent1"/>
-          </a:fillRef>
-          <a:effectRef idx="0">
-            <a:schemeClr val="accent1"/>
-          </a:effectRef>
-          <a:fontRef idx="minor">
-            <a:schemeClr val="lt1"/>
-          </a:fontRef>
-        </p:style>
-        <p:txBody>
-          <a:bodyPr rtlCol="0" anchor="ctr"/>
-          <a:lstStyle/>
-          <a:p>
-            <a:pPr algn="ctr"/>
-            <a:r>
-              <a:rPr lang="en-US" dirty="0">
-                <a:solidFill>
-                  <a:schemeClr val="tx1"/>
-                </a:solidFill>
-              </a:rPr>
-              <a:t>USDA Socio-demographic Info</a:t>
-            </a:r>
-          </a:p>
-        </p:txBody>
-      </p:sp>
       <p:cxnSp>
         <p:nvCxnSpPr>
           <p:cNvPr id="44" name="Straight Arrow Connector 43">
@@ -3864,52 +3805,9 @@
           <p:nvPr/>
         </p:nvCxnSpPr>
         <p:spPr>
-          <a:xfrm flipH="1">
-            <a:off x="13886007" y="1412594"/>
-            <a:ext cx="1198263" cy="880683"/>
-          </a:xfrm>
-          <a:prstGeom prst="straightConnector1">
-            <a:avLst/>
-          </a:prstGeom>
-          <a:ln w="38100">
-            <a:tailEnd type="triangle"/>
-          </a:ln>
-        </p:spPr>
-        <p:style>
-          <a:lnRef idx="1">
-            <a:schemeClr val="accent1"/>
-          </a:lnRef>
-          <a:fillRef idx="0">
-            <a:schemeClr val="accent1"/>
-          </a:fillRef>
-          <a:effectRef idx="0">
-            <a:schemeClr val="accent1"/>
-          </a:effectRef>
-          <a:fontRef idx="minor">
-            <a:schemeClr val="tx1"/>
-          </a:fontRef>
-        </p:style>
-      </p:cxnSp>
-      <p:cxnSp>
-        <p:nvCxnSpPr>
-          <p:cNvPr id="53" name="Straight Arrow Connector 52">
-            <a:extLst>
-              <a:ext uri="{FF2B5EF4-FFF2-40B4-BE49-F238E27FC236}">
-                <a16:creationId xmlns:a16="http://schemas.microsoft.com/office/drawing/2014/main" id="{09AEA83A-3660-402D-AAB9-B4528BD48D86}"/>
-              </a:ext>
-            </a:extLst>
-          </p:cNvPr>
-          <p:cNvCxnSpPr>
-            <a:cxnSpLocks/>
-            <a:stCxn id="35" idx="2"/>
-            <a:endCxn id="43" idx="0"/>
-          </p:cNvCxnSpPr>
-          <p:nvPr/>
-        </p:nvCxnSpPr>
-        <p:spPr>
-          <a:xfrm>
-            <a:off x="15084270" y="1412594"/>
-            <a:ext cx="1257747" cy="880683"/>
+          <a:xfrm>
+            <a:off x="12711324" y="1387644"/>
+            <a:ext cx="1174683" cy="905633"/>
           </a:xfrm>
           <a:prstGeom prst="straightConnector1">
             <a:avLst/>
@@ -3947,7 +3845,7 @@
         </p:nvSpPr>
         <p:spPr>
           <a:xfrm>
-            <a:off x="19017637" y="482010"/>
+            <a:off x="16778844" y="482010"/>
             <a:ext cx="1838322" cy="930583"/>
           </a:xfrm>
           <a:prstGeom prst="rect">
@@ -4006,7 +3904,7 @@
         </p:nvSpPr>
         <p:spPr>
           <a:xfrm>
-            <a:off x="17783421" y="2293277"/>
+            <a:off x="15544628" y="2293277"/>
             <a:ext cx="1838322" cy="930583"/>
           </a:xfrm>
           <a:prstGeom prst="rect">
@@ -4065,7 +3963,7 @@
         </p:nvSpPr>
         <p:spPr>
           <a:xfrm>
-            <a:off x="20239427" y="2293277"/>
+            <a:off x="18000634" y="2293277"/>
             <a:ext cx="1838322" cy="930583"/>
           </a:xfrm>
           <a:prstGeom prst="rect">
@@ -4127,7 +4025,7 @@
         </p:nvCxnSpPr>
         <p:spPr>
           <a:xfrm flipH="1">
-            <a:off x="18702582" y="1412594"/>
+            <a:off x="16463789" y="1412594"/>
             <a:ext cx="1234222" cy="880683"/>
           </a:xfrm>
           <a:prstGeom prst="straightConnector1">
@@ -4170,7 +4068,7 @@
         </p:nvCxnSpPr>
         <p:spPr>
           <a:xfrm>
-            <a:off x="19936801" y="1412594"/>
+            <a:off x="17698008" y="1412594"/>
             <a:ext cx="1221788" cy="880683"/>
           </a:xfrm>
           <a:prstGeom prst="straightConnector1">
@@ -4544,78 +4442,6 @@
       </p:sp>
       <p:sp>
         <p:nvSpPr>
-          <p:cNvPr id="69" name="Rectangle 68">
-            <a:extLst>
-              <a:ext uri="{FF2B5EF4-FFF2-40B4-BE49-F238E27FC236}">
-                <a16:creationId xmlns:a16="http://schemas.microsoft.com/office/drawing/2014/main" id="{5F3A8997-1B25-4540-AD19-6F7AC853BE33}"/>
-              </a:ext>
-            </a:extLst>
-          </p:cNvPr>
-          <p:cNvSpPr/>
-          <p:nvPr/>
-        </p:nvSpPr>
-        <p:spPr>
-          <a:xfrm>
-            <a:off x="15422852" y="3635880"/>
-            <a:ext cx="1838322" cy="930583"/>
-          </a:xfrm>
-          <a:prstGeom prst="rect">
-            <a:avLst/>
-          </a:prstGeom>
-          <a:solidFill>
-            <a:schemeClr val="accent1">
-              <a:lumMod val="20000"/>
-              <a:lumOff val="80000"/>
-            </a:schemeClr>
-          </a:solidFill>
-        </p:spPr>
-        <p:style>
-          <a:lnRef idx="2">
-            <a:schemeClr val="accent1">
-              <a:shade val="50000"/>
-            </a:schemeClr>
-          </a:lnRef>
-          <a:fillRef idx="1">
-            <a:schemeClr val="accent1"/>
-          </a:fillRef>
-          <a:effectRef idx="0">
-            <a:schemeClr val="accent1"/>
-          </a:effectRef>
-          <a:fontRef idx="minor">
-            <a:schemeClr val="lt1"/>
-          </a:fontRef>
-        </p:style>
-        <p:txBody>
-          <a:bodyPr rtlCol="0" anchor="ctr"/>
-          <a:lstStyle/>
-          <a:p>
-            <a:pPr algn="ctr"/>
-            <a:r>
-              <a:rPr lang="en-US" dirty="0">
-                <a:solidFill>
-                  <a:schemeClr val="tx1"/>
-                </a:solidFill>
-              </a:rPr>
-              <a:t>Convert csv to Pandas </a:t>
-            </a:r>
-            <a:r>
-              <a:rPr lang="en-US" dirty="0" err="1">
-                <a:solidFill>
-                  <a:schemeClr val="tx1"/>
-                </a:solidFill>
-              </a:rPr>
-              <a:t>Dataframes</a:t>
-            </a:r>
-            <a:endParaRPr lang="en-US" dirty="0">
-              <a:solidFill>
-                <a:schemeClr val="tx1"/>
-              </a:solidFill>
-            </a:endParaRPr>
-          </a:p>
-        </p:txBody>
-      </p:sp>
-      <p:sp>
-        <p:nvSpPr>
           <p:cNvPr id="70" name="Rectangle 69">
             <a:extLst>
               <a:ext uri="{FF2B5EF4-FFF2-40B4-BE49-F238E27FC236}">
@@ -4628,7 +4454,7 @@
         </p:nvSpPr>
         <p:spPr>
           <a:xfrm>
-            <a:off x="18967829" y="3635880"/>
+            <a:off x="16729036" y="3635880"/>
             <a:ext cx="1838322" cy="930583"/>
           </a:xfrm>
           <a:prstGeom prst="rect">
@@ -4703,7 +4529,7 @@
         </p:nvCxnSpPr>
         <p:spPr>
           <a:xfrm>
-            <a:off x="18702583" y="3223862"/>
+            <a:off x="16463790" y="3223862"/>
             <a:ext cx="1184408" cy="412022"/>
           </a:xfrm>
           <a:prstGeom prst="straightConnector1">
@@ -4745,51 +4571,8 @@
         </p:nvCxnSpPr>
         <p:spPr>
           <a:xfrm flipH="1">
-            <a:off x="19886990" y="3223862"/>
+            <a:off x="17648197" y="3223862"/>
             <a:ext cx="1271597" cy="412022"/>
-          </a:xfrm>
-          <a:prstGeom prst="straightConnector1">
-            <a:avLst/>
-          </a:prstGeom>
-          <a:ln w="38100">
-            <a:tailEnd type="triangle"/>
-          </a:ln>
-        </p:spPr>
-        <p:style>
-          <a:lnRef idx="1">
-            <a:schemeClr val="accent1"/>
-          </a:lnRef>
-          <a:fillRef idx="0">
-            <a:schemeClr val="accent1"/>
-          </a:fillRef>
-          <a:effectRef idx="0">
-            <a:schemeClr val="accent1"/>
-          </a:effectRef>
-          <a:fontRef idx="minor">
-            <a:schemeClr val="tx1"/>
-          </a:fontRef>
-        </p:style>
-      </p:cxnSp>
-      <p:cxnSp>
-        <p:nvCxnSpPr>
-          <p:cNvPr id="76" name="Straight Arrow Connector 75">
-            <a:extLst>
-              <a:ext uri="{FF2B5EF4-FFF2-40B4-BE49-F238E27FC236}">
-                <a16:creationId xmlns:a16="http://schemas.microsoft.com/office/drawing/2014/main" id="{1923BDEF-4284-40FE-B199-96EF729F9828}"/>
-              </a:ext>
-            </a:extLst>
-          </p:cNvPr>
-          <p:cNvCxnSpPr>
-            <a:cxnSpLocks/>
-            <a:stCxn id="43" idx="2"/>
-            <a:endCxn id="69" idx="0"/>
-          </p:cNvCxnSpPr>
-          <p:nvPr/>
-        </p:nvCxnSpPr>
-        <p:spPr>
-          <a:xfrm>
-            <a:off x="16342013" y="3223862"/>
-            <a:ext cx="0" cy="412022"/>
           </a:xfrm>
           <a:prstGeom prst="straightConnector1">
             <a:avLst/>
@@ -5465,49 +5248,6 @@
       </p:cxnSp>
       <p:cxnSp>
         <p:nvCxnSpPr>
-          <p:cNvPr id="119" name="Straight Arrow Connector 118">
-            <a:extLst>
-              <a:ext uri="{FF2B5EF4-FFF2-40B4-BE49-F238E27FC236}">
-                <a16:creationId xmlns:a16="http://schemas.microsoft.com/office/drawing/2014/main" id="{7FDC0DE4-259F-4D82-A872-5D8FDFF5BBCD}"/>
-              </a:ext>
-            </a:extLst>
-          </p:cNvPr>
-          <p:cNvCxnSpPr>
-            <a:cxnSpLocks/>
-            <a:stCxn id="69" idx="2"/>
-            <a:endCxn id="103" idx="0"/>
-          </p:cNvCxnSpPr>
-          <p:nvPr/>
-        </p:nvCxnSpPr>
-        <p:spPr>
-          <a:xfrm flipH="1">
-            <a:off x="13886007" y="4566463"/>
-            <a:ext cx="2456006" cy="3128835"/>
-          </a:xfrm>
-          <a:prstGeom prst="straightConnector1">
-            <a:avLst/>
-          </a:prstGeom>
-          <a:ln w="38100">
-            <a:tailEnd type="triangle"/>
-          </a:ln>
-        </p:spPr>
-        <p:style>
-          <a:lnRef idx="1">
-            <a:schemeClr val="accent1"/>
-          </a:lnRef>
-          <a:fillRef idx="0">
-            <a:schemeClr val="accent1"/>
-          </a:fillRef>
-          <a:effectRef idx="0">
-            <a:schemeClr val="accent1"/>
-          </a:effectRef>
-          <a:fontRef idx="minor">
-            <a:schemeClr val="tx1"/>
-          </a:fontRef>
-        </p:style>
-      </p:cxnSp>
-      <p:cxnSp>
-        <p:nvCxnSpPr>
           <p:cNvPr id="123" name="Straight Arrow Connector 122">
             <a:extLst>
               <a:ext uri="{FF2B5EF4-FFF2-40B4-BE49-F238E27FC236}">
@@ -5525,7 +5265,7 @@
         <p:spPr>
           <a:xfrm flipH="1">
             <a:off x="13886007" y="4566463"/>
-            <a:ext cx="6000983" cy="3128835"/>
+            <a:ext cx="3762190" cy="3128835"/>
           </a:xfrm>
           <a:prstGeom prst="straightConnector1">
             <a:avLst/>
@@ -5964,6 +5704,49 @@
           </a:p>
         </p:txBody>
       </p:sp>
+      <p:cxnSp>
+        <p:nvCxnSpPr>
+          <p:cNvPr id="62" name="Straight Arrow Connector 61">
+            <a:extLst>
+              <a:ext uri="{FF2B5EF4-FFF2-40B4-BE49-F238E27FC236}">
+                <a16:creationId xmlns:a16="http://schemas.microsoft.com/office/drawing/2014/main" id="{0DDC0F4A-5D32-40AC-BC39-AA2FC7A6A4C0}"/>
+              </a:ext>
+            </a:extLst>
+          </p:cNvPr>
+          <p:cNvCxnSpPr>
+            <a:cxnSpLocks/>
+            <a:stCxn id="35" idx="2"/>
+            <a:endCxn id="34" idx="0"/>
+          </p:cNvCxnSpPr>
+          <p:nvPr/>
+        </p:nvCxnSpPr>
+        <p:spPr>
+          <a:xfrm flipH="1">
+            <a:off x="11430000" y="1387644"/>
+            <a:ext cx="1281324" cy="905633"/>
+          </a:xfrm>
+          <a:prstGeom prst="straightConnector1">
+            <a:avLst/>
+          </a:prstGeom>
+          <a:ln w="38100">
+            <a:tailEnd type="triangle"/>
+          </a:ln>
+        </p:spPr>
+        <p:style>
+          <a:lnRef idx="1">
+            <a:schemeClr val="accent1"/>
+          </a:lnRef>
+          <a:fillRef idx="0">
+            <a:schemeClr val="accent1"/>
+          </a:fillRef>
+          <a:effectRef idx="0">
+            <a:schemeClr val="accent1"/>
+          </a:effectRef>
+          <a:fontRef idx="minor">
+            <a:schemeClr val="tx1"/>
+          </a:fontRef>
+        </p:style>
+      </p:cxnSp>
     </p:spTree>
     <p:extLst>
       <p:ext uri="{BB962C8B-B14F-4D97-AF65-F5344CB8AC3E}">

</xml_diff>